<commit_message>
changed FSM picture so Jump instruction wasn't in blue
</commit_message>
<xml_diff>
--- a/Multicycle_Processor.pptx
+++ b/Multicycle_Processor.pptx
@@ -203,7 +203,8 @@
           <a:p>
             <a:fld id="{4282724D-9F92-4D72-973E-EC71183F6AB4}" type="datetimeFigureOut">
               <a:rPr lang="en-US" smtClean="0"/>
-              <a:t>5/5/2011</a:t>
+              <a:pPr/>
+              <a:t>5/8/2011</a:t>
             </a:fld>
             <a:endParaRPr lang="en-US"/>
           </a:p>
@@ -364,6 +365,7 @@
           <a:p>
             <a:fld id="{DB864BC5-0A64-4272-B8A5-4BF0A7B2D8D8}" type="slidenum">
               <a:rPr lang="en-US" smtClean="0"/>
+              <a:pPr/>
               <a:t>‹#›</a:t>
             </a:fld>
             <a:endParaRPr lang="en-US"/>
@@ -543,6 +545,7 @@
           <a:p>
             <a:fld id="{DB864BC5-0A64-4272-B8A5-4BF0A7B2D8D8}" type="slidenum">
               <a:rPr lang="en-US" smtClean="0"/>
+              <a:pPr/>
               <a:t>3</a:t>
             </a:fld>
             <a:endParaRPr lang="en-US"/>
@@ -640,6 +643,7 @@
           <a:p>
             <a:fld id="{DB864BC5-0A64-4272-B8A5-4BF0A7B2D8D8}" type="slidenum">
               <a:rPr lang="en-US" smtClean="0"/>
+              <a:pPr/>
               <a:t>6</a:t>
             </a:fld>
             <a:endParaRPr lang="en-US"/>
@@ -729,6 +733,7 @@
           <a:p>
             <a:fld id="{DB864BC5-0A64-4272-B8A5-4BF0A7B2D8D8}" type="slidenum">
               <a:rPr lang="en-US" smtClean="0"/>
+              <a:pPr/>
               <a:t>8</a:t>
             </a:fld>
             <a:endParaRPr lang="en-US"/>
@@ -826,6 +831,7 @@
           <a:p>
             <a:fld id="{DB864BC5-0A64-4272-B8A5-4BF0A7B2D8D8}" type="slidenum">
               <a:rPr lang="en-US" smtClean="0"/>
+              <a:pPr/>
               <a:t>9</a:t>
             </a:fld>
             <a:endParaRPr lang="en-US"/>
@@ -919,6 +925,7 @@
           <a:p>
             <a:fld id="{DB864BC5-0A64-4272-B8A5-4BF0A7B2D8D8}" type="slidenum">
               <a:rPr lang="en-US" smtClean="0"/>
+              <a:pPr/>
               <a:t>10</a:t>
             </a:fld>
             <a:endParaRPr lang="en-US"/>
@@ -1592,7 +1599,7 @@
             <a:fld id="{B1BC1807-1576-4029-A81D-32F173C22C45}" type="datetimeFigureOut">
               <a:rPr lang="en-US" smtClean="0"/>
               <a:pPr/>
-              <a:t>5/5/2011</a:t>
+              <a:t>5/8/2011</a:t>
             </a:fld>
             <a:endParaRPr lang="en-US"/>
           </a:p>
@@ -1777,7 +1784,7 @@
             <a:fld id="{B1BC1807-1576-4029-A81D-32F173C22C45}" type="datetimeFigureOut">
               <a:rPr lang="en-US" smtClean="0"/>
               <a:pPr/>
-              <a:t>5/5/2011</a:t>
+              <a:t>5/8/2011</a:t>
             </a:fld>
             <a:endParaRPr lang="en-US"/>
           </a:p>
@@ -1954,7 +1961,7 @@
             <a:fld id="{B1BC1807-1576-4029-A81D-32F173C22C45}" type="datetimeFigureOut">
               <a:rPr lang="en-US" smtClean="0"/>
               <a:pPr/>
-              <a:t>5/5/2011</a:t>
+              <a:t>5/8/2011</a:t>
             </a:fld>
             <a:endParaRPr lang="en-US"/>
           </a:p>
@@ -2121,7 +2128,7 @@
             <a:fld id="{B1BC1807-1576-4029-A81D-32F173C22C45}" type="datetimeFigureOut">
               <a:rPr lang="en-US" smtClean="0"/>
               <a:pPr/>
-              <a:t>5/5/2011</a:t>
+              <a:t>5/8/2011</a:t>
             </a:fld>
             <a:endParaRPr lang="en-US"/>
           </a:p>
@@ -2344,7 +2351,7 @@
             <a:fld id="{B1BC1807-1576-4029-A81D-32F173C22C45}" type="datetimeFigureOut">
               <a:rPr lang="en-US" smtClean="0"/>
               <a:pPr/>
-              <a:t>5/5/2011</a:t>
+              <a:t>5/8/2011</a:t>
             </a:fld>
             <a:endParaRPr lang="en-US"/>
           </a:p>
@@ -2605,7 +2612,7 @@
             <a:fld id="{B1BC1807-1576-4029-A81D-32F173C22C45}" type="datetimeFigureOut">
               <a:rPr lang="en-US" smtClean="0"/>
               <a:pPr/>
-              <a:t>5/5/2011</a:t>
+              <a:t>5/8/2011</a:t>
             </a:fld>
             <a:endParaRPr lang="en-US"/>
           </a:p>
@@ -3011,7 +3018,7 @@
             <a:fld id="{B1BC1807-1576-4029-A81D-32F173C22C45}" type="datetimeFigureOut">
               <a:rPr lang="en-US" smtClean="0"/>
               <a:pPr/>
-              <a:t>5/5/2011</a:t>
+              <a:t>5/8/2011</a:t>
             </a:fld>
             <a:endParaRPr lang="en-US"/>
           </a:p>
@@ -3144,7 +3151,7 @@
             <a:fld id="{B1BC1807-1576-4029-A81D-32F173C22C45}" type="datetimeFigureOut">
               <a:rPr lang="en-US" smtClean="0"/>
               <a:pPr/>
-              <a:t>5/5/2011</a:t>
+              <a:t>5/8/2011</a:t>
             </a:fld>
             <a:endParaRPr lang="en-US"/>
           </a:p>
@@ -3246,7 +3253,7 @@
             <a:fld id="{B1BC1807-1576-4029-A81D-32F173C22C45}" type="datetimeFigureOut">
               <a:rPr lang="en-US" smtClean="0"/>
               <a:pPr/>
-              <a:t>5/5/2011</a:t>
+              <a:t>5/8/2011</a:t>
             </a:fld>
             <a:endParaRPr lang="en-US"/>
           </a:p>
@@ -3493,7 +3500,7 @@
             <a:fld id="{B1BC1807-1576-4029-A81D-32F173C22C45}" type="datetimeFigureOut">
               <a:rPr lang="en-US" smtClean="0"/>
               <a:pPr/>
-              <a:t>5/5/2011</a:t>
+              <a:t>5/8/2011</a:t>
             </a:fld>
             <a:endParaRPr lang="en-US"/>
           </a:p>
@@ -3739,7 +3746,7 @@
             <a:fld id="{B1BC1807-1576-4029-A81D-32F173C22C45}" type="datetimeFigureOut">
               <a:rPr lang="en-US" smtClean="0"/>
               <a:pPr/>
-              <a:t>5/5/2011</a:t>
+              <a:t>5/8/2011</a:t>
             </a:fld>
             <a:endParaRPr lang="en-US"/>
           </a:p>
@@ -4565,7 +4572,7 @@
             <a:fld id="{B1BC1807-1576-4029-A81D-32F173C22C45}" type="datetimeFigureOut">
               <a:rPr lang="en-US" smtClean="0"/>
               <a:pPr/>
-              <a:t>5/5/2011</a:t>
+              <a:t>5/8/2011</a:t>
             </a:fld>
             <a:endParaRPr lang="en-US"/>
           </a:p>
@@ -5010,10 +5017,6 @@
               <a:rPr lang="en-US" dirty="0" smtClean="0"/>
               <a:t>, </a:t>
             </a:r>
-            <a:r>
-              <a:rPr lang="en-US" dirty="0" smtClean="0"/>
-              <a:t/>
-            </a:r>
             <a:br>
               <a:rPr lang="en-US" dirty="0" smtClean="0"/>
             </a:br>
@@ -5287,11 +5290,7 @@
             <a:pPr lvl="1"/>
             <a:r>
               <a:rPr lang="en-US" dirty="0" smtClean="0"/>
-              <a:t>52% R-type </a:t>
-            </a:r>
-            <a:r>
-              <a:rPr lang="en-US" dirty="0" smtClean="0"/>
-              <a:t>instructions</a:t>
+              <a:t>52% R-type instructions</a:t>
             </a:r>
           </a:p>
           <a:p>
@@ -5544,11 +5543,7 @@
             </a:r>
             <a:r>
               <a:rPr lang="en-US" dirty="0" smtClean="0"/>
-              <a:t> and controller </a:t>
-            </a:r>
-            <a:r>
-              <a:rPr lang="en-US" dirty="0" smtClean="0"/>
-              <a:t>of the </a:t>
+              <a:t> and controller of the </a:t>
             </a:r>
             <a:r>
               <a:rPr lang="en-US" dirty="0" err="1" smtClean="0"/>
@@ -6113,15 +6108,7 @@
           <a:p>
             <a:r>
               <a:rPr lang="en-US" dirty="0" smtClean="0"/>
-              <a:t>Control Signals </a:t>
-            </a:r>
-            <a:r>
-              <a:rPr lang="en-US" dirty="0" smtClean="0"/>
-              <a:t>define </a:t>
-            </a:r>
-            <a:r>
-              <a:rPr lang="en-US" dirty="0" smtClean="0"/>
-              <a:t>the </a:t>
+              <a:t>Control Signals define the </a:t>
             </a:r>
             <a:r>
               <a:rPr lang="en-US" dirty="0" err="1" smtClean="0"/>
@@ -6136,25 +6123,8 @@
             </a:r>
             <a:r>
               <a:rPr lang="en-US" dirty="0" smtClean="0"/>
-              <a:t> changes </a:t>
-            </a:r>
-            <a:r>
-              <a:rPr lang="en-US" dirty="0" smtClean="0"/>
-              <a:t>depending on </a:t>
-            </a:r>
-            <a:r>
-              <a:rPr lang="en-US" dirty="0" smtClean="0"/>
-              <a:t>the 3 type </a:t>
-            </a:r>
-            <a:r>
-              <a:rPr lang="en-US" dirty="0" smtClean="0"/>
-              <a:t>of </a:t>
-            </a:r>
-            <a:r>
-              <a:rPr lang="en-US" dirty="0" smtClean="0"/>
-              <a:t>instructions</a:t>
-            </a:r>
-            <a:endParaRPr lang="en-US" dirty="0" smtClean="0"/>
+              <a:t> changes depending on the 3 type of instructions</a:t>
+            </a:r>
           </a:p>
           <a:p>
             <a:pPr lvl="1"/>
@@ -6247,7 +6217,9 @@
           </p:nvPr>
         </p:nvPicPr>
         <p:blipFill>
-          <a:blip r:embed="rId3" cstate="print"/>
+          <a:blip r:embed="rId3" cstate="print">
+            <a:biLevel thresh="50000"/>
+          </a:blip>
           <a:srcRect/>
           <a:stretch>
             <a:fillRect/>
@@ -6340,26 +6312,13 @@
           <a:p>
             <a:r>
               <a:rPr lang="en-US" dirty="0" smtClean="0"/>
-              <a:t>Performance is measured by </a:t>
-            </a:r>
+              <a:t>Performance is measured by Cycles Per Instruction (CPI) </a:t>
+            </a:r>
+          </a:p>
+          <a:p>
             <a:r>
               <a:rPr lang="en-US" dirty="0" smtClean="0"/>
-              <a:t>Cycles Per Instruction (CPI) </a:t>
-            </a:r>
-            <a:endParaRPr lang="en-US" dirty="0" smtClean="0"/>
-          </a:p>
-          <a:p>
-            <a:r>
-              <a:rPr lang="en-US" dirty="0" smtClean="0"/>
-              <a:t>CPI can be translated </a:t>
-            </a:r>
-            <a:r>
-              <a:rPr lang="en-US" dirty="0" smtClean="0"/>
-              <a:t>into </a:t>
-            </a:r>
-            <a:r>
-              <a:rPr lang="en-US" dirty="0" smtClean="0"/>
-              <a:t>Execution Time</a:t>
+              <a:t>CPI can be translated into Execution Time</a:t>
             </a:r>
           </a:p>
           <a:p>

</xml_diff>

<commit_message>
added content from google docs
</commit_message>
<xml_diff>
--- a/Multicycle_Processor.pptx
+++ b/Multicycle_Processor.pptx
@@ -5,7 +5,7 @@
     <p:sldMasterId id="2147483684" r:id="rId1"/>
   </p:sldMasterIdLst>
   <p:notesMasterIdLst>
-    <p:notesMasterId r:id="rId14"/>
+    <p:notesMasterId r:id="rId15"/>
   </p:notesMasterIdLst>
   <p:sldIdLst>
     <p:sldId id="256" r:id="rId2"/>
@@ -16,10 +16,11 @@
     <p:sldId id="261" r:id="rId7"/>
     <p:sldId id="262" r:id="rId8"/>
     <p:sldId id="263" r:id="rId9"/>
-    <p:sldId id="264" r:id="rId10"/>
-    <p:sldId id="265" r:id="rId11"/>
-    <p:sldId id="266" r:id="rId12"/>
-    <p:sldId id="267" r:id="rId13"/>
+    <p:sldId id="268" r:id="rId10"/>
+    <p:sldId id="264" r:id="rId11"/>
+    <p:sldId id="265" r:id="rId12"/>
+    <p:sldId id="266" r:id="rId13"/>
+    <p:sldId id="267" r:id="rId14"/>
   </p:sldIdLst>
   <p:sldSz cx="9144000" cy="6858000" type="screen4x3"/>
   <p:notesSz cx="6858000" cy="9144000"/>
@@ -832,7 +833,7 @@
             <a:fld id="{DB864BC5-0A64-4272-B8A5-4BF0A7B2D8D8}" type="slidenum">
               <a:rPr lang="en-US" smtClean="0"/>
               <a:pPr/>
-              <a:t>9</a:t>
+              <a:t>10</a:t>
             </a:fld>
             <a:endParaRPr lang="en-US"/>
           </a:p>
@@ -926,7 +927,7 @@
             <a:fld id="{DB864BC5-0A64-4272-B8A5-4BF0A7B2D8D8}" type="slidenum">
               <a:rPr lang="en-US" smtClean="0"/>
               <a:pPr/>
-              <a:t>10</a:t>
+              <a:t>11</a:t>
             </a:fld>
             <a:endParaRPr lang="en-US"/>
           </a:p>
@@ -5130,52 +5131,167 @@
           <a:p>
             <a:r>
               <a:rPr lang="en-US" dirty="0" smtClean="0"/>
-              <a:t>Cycles per instruction</a:t>
-            </a:r>
-          </a:p>
-          <a:p>
-            <a:pPr lvl="1"/>
-            <a:r>
-              <a:rPr lang="en-US" dirty="0" smtClean="0"/>
-              <a:t>Load Word = 5 Cycles</a:t>
-            </a:r>
-          </a:p>
-          <a:p>
-            <a:pPr lvl="1"/>
-            <a:r>
-              <a:rPr lang="en-US" dirty="0" smtClean="0"/>
-              <a:t>Store Word = 4 Cycles</a:t>
-            </a:r>
-          </a:p>
-          <a:p>
-            <a:pPr lvl="1"/>
-            <a:r>
-              <a:rPr lang="en-US" dirty="0" smtClean="0"/>
-              <a:t>R –Type = 4 Cycles</a:t>
-            </a:r>
-          </a:p>
-          <a:p>
-            <a:pPr lvl="1"/>
-            <a:r>
-              <a:rPr lang="en-US" dirty="0" smtClean="0"/>
-              <a:t>Branch = 3 Cycles</a:t>
-            </a:r>
-          </a:p>
-          <a:p>
-            <a:pPr lvl="1"/>
-            <a:r>
-              <a:rPr lang="en-US" dirty="0" smtClean="0"/>
-              <a:t>Jump = 3 Cycles</a:t>
-            </a:r>
-          </a:p>
-          <a:p>
-            <a:pPr lvl="1">
+              <a:t>Performance is measured by Cycles Per Instruction (CPI) </a:t>
+            </a:r>
+          </a:p>
+          <a:p>
+            <a:r>
+              <a:rPr lang="en-US" dirty="0" smtClean="0"/>
+              <a:t>CPI can be translated into Execution Time</a:t>
+            </a:r>
+          </a:p>
+          <a:p>
+            <a:r>
+              <a:rPr lang="en-US" dirty="0" smtClean="0"/>
+              <a:t>Execution Time is</a:t>
+            </a:r>
+            <a:br>
+              <a:rPr lang="en-US" dirty="0" smtClean="0"/>
+            </a:br>
+            <a:r>
+              <a:rPr lang="en-US" dirty="0" smtClean="0"/>
+              <a:t>	</a:t>
+            </a:r>
+            <a:endParaRPr lang="en-US" dirty="0"/>
+          </a:p>
+        </p:txBody>
+      </p:sp>
+      <p:sp>
+        <p:nvSpPr>
+          <p:cNvPr id="1026" name="Rectangle 2"/>
+          <p:cNvSpPr>
+            <a:spLocks noChangeArrowheads="1"/>
+          </p:cNvSpPr>
+          <p:nvPr/>
+        </p:nvSpPr>
+        <p:spPr bwMode="auto">
+          <a:xfrm>
+            <a:off x="0" y="0"/>
+            <a:ext cx="9144000" cy="457200"/>
+          </a:xfrm>
+          <a:prstGeom prst="rect">
+            <a:avLst/>
+          </a:prstGeom>
+          <a:noFill/>
+          <a:ln w="9525">
+            <a:noFill/>
+            <a:miter lim="800000"/>
+            <a:headEnd/>
+            <a:tailEnd/>
+          </a:ln>
+          <a:effectLst/>
+        </p:spPr>
+        <p:txBody>
+          <a:bodyPr vert="horz" wrap="none" lIns="91440" tIns="45720" rIns="91440" bIns="45720" numCol="1" anchor="ctr" anchorCtr="0" compatLnSpc="1">
+            <a:prstTxWarp prst="textNoShape">
+              <a:avLst/>
+            </a:prstTxWarp>
+            <a:spAutoFit/>
+          </a:bodyPr>
+          <a:lstStyle/>
+          <a:p>
+            <a:endParaRPr lang="en-US"/>
+          </a:p>
+        </p:txBody>
+      </p:sp>
+      <p:pic>
+        <p:nvPicPr>
+          <p:cNvPr id="1025" name="Picture 1"/>
+          <p:cNvPicPr>
+            <a:picLocks noChangeAspect="1" noChangeArrowheads="1"/>
+          </p:cNvPicPr>
+          <p:nvPr/>
+        </p:nvPicPr>
+        <p:blipFill>
+          <a:blip r:embed="rId3" cstate="print">
+            <a:clrChange>
+              <a:clrFrom>
+                <a:srgbClr val="FFFFFF"/>
+              </a:clrFrom>
+              <a:clrTo>
+                <a:srgbClr val="FFFFFF">
+                  <a:alpha val="0"/>
+                </a:srgbClr>
+              </a:clrTo>
+            </a:clrChange>
+          </a:blip>
+          <a:srcRect/>
+          <a:stretch>
+            <a:fillRect/>
+          </a:stretch>
+        </p:blipFill>
+        <p:spPr bwMode="auto">
+          <a:xfrm>
+            <a:off x="1143000" y="4303059"/>
+            <a:ext cx="7162800" cy="421341"/>
+          </a:xfrm>
+          <a:prstGeom prst="rect">
+            <a:avLst/>
+          </a:prstGeom>
+          <a:noFill/>
+        </p:spPr>
+      </p:pic>
+      <p:sp>
+        <p:nvSpPr>
+          <p:cNvPr id="1027" name="Rectangle 3"/>
+          <p:cNvSpPr>
+            <a:spLocks noChangeArrowheads="1"/>
+          </p:cNvSpPr>
+          <p:nvPr/>
+        </p:nvSpPr>
+        <p:spPr bwMode="auto">
+          <a:xfrm>
+            <a:off x="0" y="647700"/>
+            <a:ext cx="9144000" cy="0"/>
+          </a:xfrm>
+          <a:prstGeom prst="rect">
+            <a:avLst/>
+          </a:prstGeom>
+          <a:noFill/>
+          <a:ln w="9525">
+            <a:noFill/>
+            <a:miter lim="800000"/>
+            <a:headEnd/>
+            <a:tailEnd/>
+          </a:ln>
+          <a:effectLst/>
+        </p:spPr>
+        <p:txBody>
+          <a:bodyPr vert="horz" wrap="none" lIns="91440" tIns="45720" rIns="91440" bIns="45720" numCol="1" anchor="ctr" anchorCtr="0" compatLnSpc="1">
+            <a:prstTxWarp prst="textNoShape">
+              <a:avLst/>
+            </a:prstTxWarp>
+            <a:spAutoFit/>
+          </a:bodyPr>
+          <a:lstStyle/>
+          <a:p>
+            <a:pPr marL="0" marR="0" lvl="0" indent="0" algn="l" defTabSz="914400" rtl="0" eaLnBrk="1" fontAlgn="base" latinLnBrk="0" hangingPunct="1">
+              <a:lnSpc>
+                <a:spcPct val="100000"/>
+              </a:lnSpc>
+              <a:spcBef>
+                <a:spcPct val="0"/>
+              </a:spcBef>
+              <a:spcAft>
+                <a:spcPct val="0"/>
+              </a:spcAft>
+              <a:buClrTx/>
+              <a:buSzTx/>
+              <a:buFontTx/>
               <a:buNone/>
+              <a:tabLst/>
             </a:pPr>
-            <a:endParaRPr lang="en-US" dirty="0" smtClean="0"/>
-          </a:p>
-          <a:p>
-            <a:endParaRPr lang="en-US" dirty="0"/>
+            <a:endParaRPr kumimoji="0" lang="en-US" sz="1800" b="0" i="0" u="none" strike="noStrike" cap="none" normalizeH="0" baseline="0" smtClean="0">
+              <a:ln>
+                <a:noFill/>
+              </a:ln>
+              <a:solidFill>
+                <a:schemeClr val="tx1"/>
+              </a:solidFill>
+              <a:effectLst/>
+              <a:latin typeface="Arial" pitchFamily="34" charset="0"/>
+              <a:cs typeface="Arial" pitchFamily="34" charset="0"/>
+            </a:endParaRPr>
           </a:p>
         </p:txBody>
       </p:sp>
@@ -5255,61 +5371,51 @@
           <a:p>
             <a:r>
               <a:rPr lang="en-US" dirty="0" smtClean="0"/>
-              <a:t>SpecINT2000 Benchmark states</a:t>
+              <a:t>Cycles per instruction</a:t>
             </a:r>
           </a:p>
           <a:p>
             <a:pPr lvl="1"/>
             <a:r>
               <a:rPr lang="en-US" dirty="0" smtClean="0"/>
-              <a:t>25% loads</a:t>
+              <a:t>Load Word = 5 Cycles</a:t>
             </a:r>
           </a:p>
           <a:p>
             <a:pPr lvl="1"/>
             <a:r>
               <a:rPr lang="en-US" dirty="0" smtClean="0"/>
-              <a:t>10% stores</a:t>
+              <a:t>Store Word = 4 Cycles</a:t>
             </a:r>
           </a:p>
           <a:p>
             <a:pPr lvl="1"/>
             <a:r>
               <a:rPr lang="en-US" dirty="0" smtClean="0"/>
-              <a:t>11% branches</a:t>
+              <a:t>R –Type = 4 Cycles</a:t>
             </a:r>
           </a:p>
           <a:p>
             <a:pPr lvl="1"/>
             <a:r>
               <a:rPr lang="en-US" dirty="0" smtClean="0"/>
-              <a:t>2% jumps</a:t>
+              <a:t>Branch = 3 Cycles</a:t>
             </a:r>
           </a:p>
           <a:p>
             <a:pPr lvl="1"/>
             <a:r>
               <a:rPr lang="en-US" dirty="0" smtClean="0"/>
-              <a:t>52% R-type instructions</a:t>
-            </a:r>
-          </a:p>
-          <a:p>
-            <a:pPr lvl="1"/>
+              <a:t>Jump = 3 Cycles</a:t>
+            </a:r>
+          </a:p>
+          <a:p>
+            <a:pPr lvl="1">
+              <a:buNone/>
+            </a:pPr>
             <a:endParaRPr lang="en-US" dirty="0" smtClean="0"/>
           </a:p>
           <a:p>
-            <a:r>
-              <a:rPr lang="en-US" dirty="0" smtClean="0"/>
-              <a:t>Which comes to a CPI of 4.12 for </a:t>
-            </a:r>
-            <a:r>
-              <a:rPr lang="en-US" dirty="0" err="1" smtClean="0"/>
-              <a:t>Mutlicycle</a:t>
-            </a:r>
-            <a:r>
-              <a:rPr lang="en-US" dirty="0" smtClean="0"/>
-              <a:t> MIPS Processor</a:t>
-            </a:r>
             <a:endParaRPr lang="en-US" dirty="0"/>
           </a:p>
         </p:txBody>
@@ -5330,6 +5436,141 @@
 </file>
 
 <file path=ppt/slides/slide12.xml><?xml version="1.0" encoding="utf-8"?>
+<p:sld xmlns:a="http://schemas.openxmlformats.org/drawingml/2006/main" xmlns:r="http://schemas.openxmlformats.org/officeDocument/2006/relationships" xmlns:p="http://schemas.openxmlformats.org/presentationml/2006/main">
+  <p:cSld>
+    <p:spTree>
+      <p:nvGrpSpPr>
+        <p:cNvPr id="1" name=""/>
+        <p:cNvGrpSpPr/>
+        <p:nvPr/>
+      </p:nvGrpSpPr>
+      <p:grpSpPr>
+        <a:xfrm>
+          <a:off x="0" y="0"/>
+          <a:ext cx="0" cy="0"/>
+          <a:chOff x="0" y="0"/>
+          <a:chExt cx="0" cy="0"/>
+        </a:xfrm>
+      </p:grpSpPr>
+      <p:sp>
+        <p:nvSpPr>
+          <p:cNvPr id="2" name="Title 1"/>
+          <p:cNvSpPr>
+            <a:spLocks noGrp="1"/>
+          </p:cNvSpPr>
+          <p:nvPr>
+            <p:ph type="title"/>
+          </p:nvPr>
+        </p:nvSpPr>
+        <p:spPr/>
+        <p:txBody>
+          <a:bodyPr/>
+          <a:lstStyle/>
+          <a:p>
+            <a:r>
+              <a:rPr lang="en-US" dirty="0" err="1" smtClean="0"/>
+              <a:t>Multicycle</a:t>
+            </a:r>
+            <a:r>
+              <a:rPr lang="en-US" dirty="0" smtClean="0"/>
+              <a:t> Performance</a:t>
+            </a:r>
+            <a:endParaRPr lang="en-US" dirty="0"/>
+          </a:p>
+        </p:txBody>
+      </p:sp>
+      <p:sp>
+        <p:nvSpPr>
+          <p:cNvPr id="3" name="Content Placeholder 2"/>
+          <p:cNvSpPr>
+            <a:spLocks noGrp="1"/>
+          </p:cNvSpPr>
+          <p:nvPr>
+            <p:ph idx="1"/>
+          </p:nvPr>
+        </p:nvSpPr>
+        <p:spPr/>
+        <p:txBody>
+          <a:bodyPr/>
+          <a:lstStyle/>
+          <a:p>
+            <a:r>
+              <a:rPr lang="en-US" dirty="0" smtClean="0"/>
+              <a:t>SpecINT2000 Benchmark states</a:t>
+            </a:r>
+          </a:p>
+          <a:p>
+            <a:pPr lvl="1"/>
+            <a:r>
+              <a:rPr lang="en-US" dirty="0" smtClean="0"/>
+              <a:t>25% loads</a:t>
+            </a:r>
+          </a:p>
+          <a:p>
+            <a:pPr lvl="1"/>
+            <a:r>
+              <a:rPr lang="en-US" dirty="0" smtClean="0"/>
+              <a:t>10% stores</a:t>
+            </a:r>
+          </a:p>
+          <a:p>
+            <a:pPr lvl="1"/>
+            <a:r>
+              <a:rPr lang="en-US" dirty="0" smtClean="0"/>
+              <a:t>11% branches</a:t>
+            </a:r>
+          </a:p>
+          <a:p>
+            <a:pPr lvl="1"/>
+            <a:r>
+              <a:rPr lang="en-US" dirty="0" smtClean="0"/>
+              <a:t>2% jumps</a:t>
+            </a:r>
+          </a:p>
+          <a:p>
+            <a:pPr lvl="1"/>
+            <a:r>
+              <a:rPr lang="en-US" dirty="0" smtClean="0"/>
+              <a:t>52% R-type instructions</a:t>
+            </a:r>
+          </a:p>
+          <a:p>
+            <a:pPr lvl="1"/>
+            <a:endParaRPr lang="en-US" dirty="0" smtClean="0"/>
+          </a:p>
+          <a:p>
+            <a:r>
+              <a:rPr lang="en-US" dirty="0" smtClean="0"/>
+              <a:t>Which comes to a CPI of 4.12 for </a:t>
+            </a:r>
+            <a:r>
+              <a:rPr lang="en-US" dirty="0" err="1" smtClean="0"/>
+              <a:t>Mutlicycle</a:t>
+            </a:r>
+            <a:r>
+              <a:rPr lang="en-US" dirty="0" smtClean="0"/>
+              <a:t> MIPS Processor</a:t>
+            </a:r>
+            <a:endParaRPr lang="en-US" dirty="0"/>
+          </a:p>
+        </p:txBody>
+      </p:sp>
+    </p:spTree>
+  </p:cSld>
+  <p:clrMapOvr>
+    <a:masterClrMapping/>
+  </p:clrMapOvr>
+  <p:timing>
+    <p:tnLst>
+      <p:par>
+        <p:cTn id="1" dur="indefinite" restart="never" nodeType="tmRoot"/>
+      </p:par>
+    </p:tnLst>
+  </p:timing>
+</p:sld>
+</file>
+
+<file path=ppt/slides/slide13.xml><?xml version="1.0" encoding="utf-8"?>
 <p:sld xmlns:a="http://schemas.openxmlformats.org/drawingml/2006/main" xmlns:r="http://schemas.openxmlformats.org/officeDocument/2006/relationships" xmlns:p="http://schemas.openxmlformats.org/presentationml/2006/main">
   <p:cSld>
     <p:spTree>
@@ -5671,7 +5912,7 @@
           <a:p>
             <a:r>
               <a:rPr lang="en-US" dirty="0" smtClean="0"/>
-              <a:t>Processor that uses multiple cycles to execute instructions.</a:t>
+              <a:t>Processor that breaks an instruction into multiple steps and uses multiple cycles to execute.</a:t>
             </a:r>
           </a:p>
           <a:p>
@@ -5723,7 +5964,9 @@
         </p:nvSpPr>
         <p:spPr/>
         <p:txBody>
-          <a:bodyPr/>
+          <a:bodyPr>
+            <a:normAutofit fontScale="90000"/>
+          </a:bodyPr>
           <a:lstStyle/>
           <a:p>
             <a:r>
@@ -5738,6 +5981,13 @@
               <a:rPr lang="en-US" dirty="0" smtClean="0"/>
               <a:t> processor</a:t>
             </a:r>
+            <a:br>
+              <a:rPr lang="en-US" dirty="0" smtClean="0"/>
+            </a:br>
+            <a:r>
+              <a:rPr lang="en-US" dirty="0" smtClean="0"/>
+              <a:t>(trade-offs over single cycle)</a:t>
+            </a:r>
             <a:endParaRPr lang="en-US" dirty="0"/>
           </a:p>
         </p:txBody>
@@ -5754,54 +6004,72 @@
         </p:nvSpPr>
         <p:spPr/>
         <p:txBody>
-          <a:bodyPr/>
-          <a:lstStyle/>
-          <a:p>
-            <a:r>
-              <a:rPr lang="en-US" dirty="0" smtClean="0"/>
-              <a:t>Economy of Chip</a:t>
+          <a:bodyPr>
+            <a:normAutofit fontScale="92500" lnSpcReduction="20000"/>
+          </a:bodyPr>
+          <a:lstStyle/>
+          <a:p>
+            <a:r>
+              <a:rPr lang="en-US" sz="3000" dirty="0" smtClean="0"/>
+              <a:t>Combined instruction memory and data memory </a:t>
             </a:r>
           </a:p>
           <a:p>
             <a:pPr lvl="1"/>
             <a:r>
               <a:rPr lang="en-US" dirty="0" smtClean="0"/>
-              <a:t>Shared Memory</a:t>
+              <a:t>Pros: Realistic, reduced chip size </a:t>
             </a:r>
           </a:p>
           <a:p>
             <a:pPr lvl="1"/>
             <a:r>
               <a:rPr lang="en-US" dirty="0" smtClean="0"/>
-              <a:t>Fewer Adders</a:t>
+              <a:t>Cons: Single read port </a:t>
+            </a:r>
+          </a:p>
+          <a:p>
+            <a:r>
+              <a:rPr lang="en-US" sz="3000" dirty="0" smtClean="0"/>
+              <a:t>Single ALU </a:t>
             </a:r>
           </a:p>
           <a:p>
             <a:pPr lvl="1"/>
-            <a:endParaRPr lang="en-US" dirty="0" smtClean="0"/>
-          </a:p>
-          <a:p>
-            <a:r>
-              <a:rPr lang="en-US" dirty="0" smtClean="0"/>
-              <a:t>More efficient</a:t>
+            <a:r>
+              <a:rPr lang="en-US" dirty="0" smtClean="0"/>
+              <a:t>Pros: Fewer complex parts, cheaper, reduced chip size </a:t>
             </a:r>
           </a:p>
           <a:p>
             <a:pPr lvl="1"/>
             <a:r>
               <a:rPr lang="en-US" dirty="0" smtClean="0"/>
-              <a:t>Not hindered by slowest instruction</a:t>
+              <a:t>Cons: Needs non-architectural state registers and a finite state machine to share ALU </a:t>
+            </a:r>
+          </a:p>
+          <a:p>
+            <a:r>
+              <a:rPr lang="en-US" sz="3000" dirty="0" smtClean="0"/>
+              <a:t>Faster clock </a:t>
             </a:r>
           </a:p>
           <a:p>
             <a:pPr lvl="1"/>
-            <a:endParaRPr lang="en-US" dirty="0" smtClean="0"/>
-          </a:p>
-          <a:p>
-            <a:pPr lvl="1">
+            <a:r>
+              <a:rPr lang="en-US" dirty="0" smtClean="0"/>
+              <a:t>Pro: Clock is determined by slowest step not instruction</a:t>
+            </a:r>
+          </a:p>
+          <a:p>
+            <a:pPr>
               <a:buNone/>
             </a:pPr>
-            <a:endParaRPr lang="en-US" dirty="0" smtClean="0"/>
+            <a:r>
+              <a:rPr lang="en-US" dirty="0" smtClean="0"/>
+              <a:t> </a:t>
+            </a:r>
+            <a:endParaRPr lang="en-US" dirty="0"/>
           </a:p>
         </p:txBody>
       </p:sp>
@@ -6288,114 +6556,25 @@
               <a:t>Multicycle</a:t>
             </a:r>
             <a:r>
-              <a:rPr lang="en-US" dirty="0" smtClean="0"/>
+              <a:rPr lang="en-US" smtClean="0"/>
               <a:t> Performance</a:t>
             </a:r>
             <a:endParaRPr lang="en-US" dirty="0"/>
-          </a:p>
-        </p:txBody>
-      </p:sp>
-      <p:sp>
-        <p:nvSpPr>
-          <p:cNvPr id="3" name="Content Placeholder 2"/>
-          <p:cNvSpPr>
-            <a:spLocks noGrp="1"/>
-          </p:cNvSpPr>
-          <p:nvPr>
-            <p:ph idx="1"/>
-          </p:nvPr>
-        </p:nvSpPr>
-        <p:spPr/>
-        <p:txBody>
-          <a:bodyPr/>
-          <a:lstStyle/>
-          <a:p>
-            <a:r>
-              <a:rPr lang="en-US" dirty="0" smtClean="0"/>
-              <a:t>Performance is measured by Cycles Per Instruction (CPI) </a:t>
-            </a:r>
-          </a:p>
-          <a:p>
-            <a:r>
-              <a:rPr lang="en-US" dirty="0" smtClean="0"/>
-              <a:t>CPI can be translated into Execution Time</a:t>
-            </a:r>
-          </a:p>
-          <a:p>
-            <a:r>
-              <a:rPr lang="en-US" dirty="0" smtClean="0"/>
-              <a:t>Execution Time is</a:t>
-            </a:r>
-            <a:br>
-              <a:rPr lang="en-US" dirty="0" smtClean="0"/>
-            </a:br>
-            <a:r>
-              <a:rPr lang="en-US" dirty="0" smtClean="0"/>
-              <a:t>	</a:t>
-            </a:r>
-            <a:endParaRPr lang="en-US" dirty="0"/>
-          </a:p>
-        </p:txBody>
-      </p:sp>
-      <p:sp>
-        <p:nvSpPr>
-          <p:cNvPr id="1026" name="Rectangle 2"/>
-          <p:cNvSpPr>
-            <a:spLocks noChangeArrowheads="1"/>
-          </p:cNvSpPr>
-          <p:nvPr/>
-        </p:nvSpPr>
-        <p:spPr bwMode="auto">
-          <a:xfrm>
-            <a:off x="0" y="0"/>
-            <a:ext cx="9144000" cy="457200"/>
-          </a:xfrm>
-          <a:prstGeom prst="rect">
-            <a:avLst/>
-          </a:prstGeom>
-          <a:noFill/>
-          <a:ln w="9525">
-            <a:noFill/>
-            <a:miter lim="800000"/>
-            <a:headEnd/>
-            <a:tailEnd/>
-          </a:ln>
-          <a:effectLst/>
-        </p:spPr>
-        <p:txBody>
-          <a:bodyPr vert="horz" wrap="none" lIns="91440" tIns="45720" rIns="91440" bIns="45720" numCol="1" anchor="ctr" anchorCtr="0" compatLnSpc="1">
-            <a:prstTxWarp prst="textNoShape">
-              <a:avLst/>
-            </a:prstTxWarp>
-            <a:spAutoFit/>
-          </a:bodyPr>
-          <a:lstStyle/>
-          <a:p>
-            <a:endParaRPr lang="en-US"/>
           </a:p>
         </p:txBody>
       </p:sp>
       <p:pic>
         <p:nvPicPr>
-          <p:cNvPr id="1025" name="Picture 1"/>
+          <p:cNvPr id="4" name="Picture 4"/>
           <p:cNvPicPr>
-            <a:picLocks noChangeAspect="1" noChangeArrowheads="1"/>
+            <a:picLocks noGrp="1" noChangeAspect="1" noChangeArrowheads="1"/>
           </p:cNvPicPr>
-          <p:nvPr/>
+          <p:nvPr>
+            <p:ph idx="1"/>
+          </p:nvPr>
         </p:nvPicPr>
         <p:blipFill>
-          <a:blip r:embed="rId3" cstate="print">
-            <a:clrChange>
-              <a:clrFrom>
-                <a:srgbClr val="FFFFFF"/>
-              </a:clrFrom>
-              <a:clrTo>
-                <a:srgbClr val="FFFFFF">
-                  <a:alpha val="0"/>
-                </a:srgbClr>
-              </a:clrTo>
-            </a:clrChange>
-          </a:blip>
+          <a:blip r:embed="rId2" cstate="print"/>
           <a:srcRect/>
           <a:stretch>
             <a:fillRect/>
@@ -6403,8 +6582,8 @@
         </p:blipFill>
         <p:spPr bwMode="auto">
           <a:xfrm>
-            <a:off x="1143000" y="4303059"/>
-            <a:ext cx="7162800" cy="421341"/>
+            <a:off x="990600" y="2362200"/>
+            <a:ext cx="7162800" cy="3991697"/>
           </a:xfrm>
           <a:prstGeom prst="rect">
             <a:avLst/>
@@ -6412,82 +6591,11 @@
           <a:noFill/>
         </p:spPr>
       </p:pic>
-      <p:sp>
-        <p:nvSpPr>
-          <p:cNvPr id="1027" name="Rectangle 3"/>
-          <p:cNvSpPr>
-            <a:spLocks noChangeArrowheads="1"/>
-          </p:cNvSpPr>
-          <p:nvPr/>
-        </p:nvSpPr>
-        <p:spPr bwMode="auto">
-          <a:xfrm>
-            <a:off x="0" y="647700"/>
-            <a:ext cx="9144000" cy="0"/>
-          </a:xfrm>
-          <a:prstGeom prst="rect">
-            <a:avLst/>
-          </a:prstGeom>
-          <a:noFill/>
-          <a:ln w="9525">
-            <a:noFill/>
-            <a:miter lim="800000"/>
-            <a:headEnd/>
-            <a:tailEnd/>
-          </a:ln>
-          <a:effectLst/>
-        </p:spPr>
-        <p:txBody>
-          <a:bodyPr vert="horz" wrap="none" lIns="91440" tIns="45720" rIns="91440" bIns="45720" numCol="1" anchor="ctr" anchorCtr="0" compatLnSpc="1">
-            <a:prstTxWarp prst="textNoShape">
-              <a:avLst/>
-            </a:prstTxWarp>
-            <a:spAutoFit/>
-          </a:bodyPr>
-          <a:lstStyle/>
-          <a:p>
-            <a:pPr marL="0" marR="0" lvl="0" indent="0" algn="l" defTabSz="914400" rtl="0" eaLnBrk="1" fontAlgn="base" latinLnBrk="0" hangingPunct="1">
-              <a:lnSpc>
-                <a:spcPct val="100000"/>
-              </a:lnSpc>
-              <a:spcBef>
-                <a:spcPct val="0"/>
-              </a:spcBef>
-              <a:spcAft>
-                <a:spcPct val="0"/>
-              </a:spcAft>
-              <a:buClrTx/>
-              <a:buSzTx/>
-              <a:buFontTx/>
-              <a:buNone/>
-              <a:tabLst/>
-            </a:pPr>
-            <a:endParaRPr kumimoji="0" lang="en-US" sz="1800" b="0" i="0" u="none" strike="noStrike" cap="none" normalizeH="0" baseline="0" smtClean="0">
-              <a:ln>
-                <a:noFill/>
-              </a:ln>
-              <a:solidFill>
-                <a:schemeClr val="tx1"/>
-              </a:solidFill>
-              <a:effectLst/>
-              <a:latin typeface="Arial" pitchFamily="34" charset="0"/>
-              <a:cs typeface="Arial" pitchFamily="34" charset="0"/>
-            </a:endParaRPr>
-          </a:p>
-        </p:txBody>
-      </p:sp>
     </p:spTree>
   </p:cSld>
   <p:clrMapOvr>
     <a:masterClrMapping/>
   </p:clrMapOvr>
-  <p:timing>
-    <p:tnLst>
-      <p:par>
-        <p:cTn id="1" dur="indefinite" restart="never" nodeType="tmRoot"/>
-      </p:par>
-    </p:tnLst>
-  </p:timing>
 </p:sld>
 </file>
 

</xml_diff>